<commit_message>
Updates and Source Code
Minor fixes in the documentation
Basic classes for the source code
</commit_message>
<xml_diff>
--- a/documentation/UserStories-CrowdDebugInfra.pptx
+++ b/documentation/UserStories-CrowdDebugInfra.pptx
@@ -1360,7 +1360,7 @@
           <a:p>
             <a:fld id="{B277B693-8FD4-4562-AFB2-31320F92FF13}" type="datetimeFigureOut">
               <a:rPr lang="en-US" smtClean="0"/>
-              <a:t>6/3/2014</a:t>
+              <a:t>6/4/2014</a:t>
             </a:fld>
             <a:endParaRPr lang="en-US"/>
           </a:p>
@@ -5416,7 +5416,7 @@
         </p:spPr>
         <p:txBody>
           <a:bodyPr>
-            <a:normAutofit fontScale="92500" lnSpcReduction="10000"/>
+            <a:normAutofit fontScale="92500" lnSpcReduction="20000"/>
           </a:bodyPr>
           <a:lstStyle/>
           <a:p>
@@ -5425,8 +5425,8 @@
               <a:buAutoNum type="arabicPeriod"/>
             </a:pPr>
             <a:r>
-              <a:rPr lang="en-US" dirty="0" smtClean="0"/>
-              <a:t>User save files on a local folder </a:t>
+              <a:rPr lang="en-US" dirty="0"/>
+              <a:t>User saves files on a local folder </a:t>
             </a:r>
           </a:p>
           <a:p>
@@ -5435,15 +5435,23 @@
               <a:buAutoNum type="arabicPeriod"/>
             </a:pPr>
             <a:r>
-              <a:rPr lang="en-US" dirty="0" smtClean="0"/>
+              <a:rPr lang="en-US" dirty="0"/>
               <a:t>User runs a java program from command line (“java </a:t>
             </a:r>
             <a:r>
-              <a:rPr lang="en-US" dirty="0" err="1" smtClean="0"/>
+              <a:rPr lang="en-US" dirty="0" err="1"/>
               <a:t>SnippetFactory</a:t>
             </a:r>
             <a:r>
-              <a:rPr lang="en-US" dirty="0" smtClean="0"/>
+              <a:rPr lang="en-US" dirty="0"/>
+              <a:t> </a:t>
+            </a:r>
+            <a:r>
+              <a:rPr lang="en-US" dirty="0" err="1"/>
+              <a:t>pathToFile</a:t>
+            </a:r>
+            <a:r>
+              <a:rPr lang="en-US" dirty="0"/>
               <a:t>”)</a:t>
             </a:r>
           </a:p>
@@ -5453,7 +5461,7 @@
               <a:buAutoNum type="arabicPeriod"/>
             </a:pPr>
             <a:r>
-              <a:rPr lang="en-US" dirty="0" smtClean="0"/>
+              <a:rPr lang="en-US" dirty="0"/>
               <a:t>The program </a:t>
             </a:r>
           </a:p>
@@ -5463,7 +5471,7 @@
               <a:buAutoNum type="arabicPeriod"/>
             </a:pPr>
             <a:r>
-              <a:rPr lang="en-US" dirty="0" smtClean="0"/>
+              <a:rPr lang="en-US" dirty="0"/>
               <a:t>Reads each file</a:t>
             </a:r>
           </a:p>
@@ -5473,7 +5481,7 @@
               <a:buAutoNum type="arabicPeriod"/>
             </a:pPr>
             <a:r>
-              <a:rPr lang="en-US" dirty="0" smtClean="0"/>
+              <a:rPr lang="en-US" dirty="0"/>
               <a:t>Extract each method</a:t>
             </a:r>
           </a:p>
@@ -5483,15 +5491,15 @@
               <a:buAutoNum type="arabicPeriod"/>
             </a:pPr>
             <a:r>
-              <a:rPr lang="en-US" dirty="0" smtClean="0"/>
-              <a:t>Create and object “</a:t>
-            </a:r>
-            <a:r>
-              <a:rPr lang="en-US" dirty="0" err="1" smtClean="0"/>
+              <a:rPr lang="en-US" dirty="0"/>
+              <a:t>Instantiate an object “</a:t>
+            </a:r>
+            <a:r>
+              <a:rPr lang="en-US" dirty="0" err="1"/>
               <a:t>CodeSnippet</a:t>
             </a:r>
             <a:r>
-              <a:rPr lang="en-US" dirty="0" smtClean="0"/>
+              <a:rPr lang="en-US" dirty="0"/>
               <a:t>” for each method within a file. Object must have the following fields:</a:t>
             </a:r>
           </a:p>
@@ -5501,15 +5509,15 @@
               <a:buAutoNum type="arabicPeriod"/>
             </a:pPr>
             <a:r>
-              <a:rPr lang="en-US" dirty="0" smtClean="0"/>
+              <a:rPr lang="en-US" dirty="0"/>
               <a:t>String </a:t>
             </a:r>
             <a:r>
-              <a:rPr lang="en-US" dirty="0" err="1" smtClean="0"/>
+              <a:rPr lang="en-US" dirty="0" err="1"/>
               <a:t>UniqueName</a:t>
             </a:r>
             <a:r>
-              <a:rPr lang="en-US" dirty="0" smtClean="0"/>
+              <a:rPr lang="en-US" dirty="0"/>
               <a:t> (path of file + name of method)</a:t>
             </a:r>
           </a:p>
@@ -5519,15 +5527,15 @@
               <a:buAutoNum type="arabicPeriod"/>
             </a:pPr>
             <a:r>
-              <a:rPr lang="en-US" dirty="0" smtClean="0"/>
+              <a:rPr lang="en-US" dirty="0"/>
               <a:t>String </a:t>
             </a:r>
             <a:r>
-              <a:rPr lang="en-US" dirty="0" err="1" smtClean="0"/>
+              <a:rPr lang="en-US" dirty="0" err="1"/>
               <a:t>VisibilityType</a:t>
             </a:r>
             <a:r>
-              <a:rPr lang="en-US" dirty="0" smtClean="0"/>
+              <a:rPr lang="en-US" dirty="0"/>
               <a:t> (“public”, “private”, “protected”)</a:t>
             </a:r>
           </a:p>
@@ -5537,15 +5545,15 @@
               <a:buAutoNum type="arabicPeriod"/>
             </a:pPr>
             <a:r>
-              <a:rPr lang="en-US" dirty="0" smtClean="0"/>
+              <a:rPr lang="en-US" dirty="0"/>
               <a:t>String </a:t>
             </a:r>
             <a:r>
-              <a:rPr lang="en-US" dirty="0" err="1" smtClean="0"/>
+              <a:rPr lang="en-US" dirty="0" err="1"/>
               <a:t>ImplementationType</a:t>
             </a:r>
             <a:r>
-              <a:rPr lang="en-US" dirty="0" smtClean="0"/>
+              <a:rPr lang="en-US" dirty="0"/>
               <a:t> (“concrete”, “abstract”)</a:t>
             </a:r>
           </a:p>
@@ -5555,15 +5563,15 @@
               <a:buAutoNum type="arabicPeriod"/>
             </a:pPr>
             <a:r>
-              <a:rPr lang="en-US" dirty="0" smtClean="0"/>
+              <a:rPr lang="en-US" dirty="0"/>
               <a:t>String </a:t>
             </a:r>
             <a:r>
-              <a:rPr lang="en-US" dirty="0" err="1" smtClean="0"/>
+              <a:rPr lang="en-US" dirty="0" err="1"/>
               <a:t>MethodBody</a:t>
             </a:r>
             <a:r>
-              <a:rPr lang="en-US" dirty="0" smtClean="0"/>
+              <a:rPr lang="en-US" dirty="0"/>
               <a:t> (the whole content of method)</a:t>
             </a:r>
           </a:p>
@@ -5573,31 +5581,31 @@
               <a:buAutoNum type="arabicPeriod"/>
             </a:pPr>
             <a:r>
-              <a:rPr lang="en-US" dirty="0" smtClean="0"/>
+              <a:rPr lang="en-US" dirty="0"/>
               <a:t>String </a:t>
             </a:r>
             <a:r>
-              <a:rPr lang="en-US" dirty="0" err="1" smtClean="0"/>
+              <a:rPr lang="en-US" dirty="0" err="1"/>
               <a:t>MethodInterface</a:t>
             </a:r>
             <a:r>
-              <a:rPr lang="en-US" dirty="0" smtClean="0"/>
+              <a:rPr lang="en-US" dirty="0"/>
               <a:t>(only the declaration of the method – e.g., “public  String </a:t>
             </a:r>
             <a:r>
-              <a:rPr lang="en-US" dirty="0" err="1" smtClean="0"/>
+              <a:rPr lang="en-US" dirty="0" err="1"/>
               <a:t>moveLine</a:t>
             </a:r>
             <a:r>
-              <a:rPr lang="en-US" dirty="0" smtClean="0"/>
+              <a:rPr lang="en-US" dirty="0"/>
               <a:t>(</a:t>
             </a:r>
             <a:r>
-              <a:rPr lang="en-US" dirty="0" err="1" smtClean="0"/>
+              <a:rPr lang="en-US" dirty="0" err="1"/>
               <a:t>int</a:t>
             </a:r>
             <a:r>
-              <a:rPr lang="en-US" dirty="0" smtClean="0"/>
+              <a:rPr lang="en-US" dirty="0"/>
               <a:t> line)”</a:t>
             </a:r>
           </a:p>
@@ -5607,15 +5615,15 @@
               <a:buAutoNum type="arabicPeriod"/>
             </a:pPr>
             <a:r>
-              <a:rPr lang="en-US" dirty="0" smtClean="0"/>
+              <a:rPr lang="en-US" dirty="0"/>
               <a:t>Boolean has </a:t>
             </a:r>
             <a:r>
-              <a:rPr lang="en-US" dirty="0" err="1" smtClean="0"/>
+              <a:rPr lang="en-US" dirty="0" err="1"/>
               <a:t>ReturnStatement</a:t>
             </a:r>
             <a:r>
-              <a:rPr lang="en-US" dirty="0" smtClean="0"/>
+              <a:rPr lang="en-US" dirty="0"/>
               <a:t> (true If is any “return” statement)</a:t>
             </a:r>
           </a:p>
@@ -5625,24 +5633,16 @@
               <a:buAutoNum type="arabicPeriod"/>
             </a:pPr>
             <a:r>
-              <a:rPr lang="en-US" dirty="0" smtClean="0"/>
+              <a:rPr lang="en-US" dirty="0"/>
               <a:t>Create a print method in the </a:t>
             </a:r>
             <a:r>
-              <a:rPr lang="en-US" dirty="0" err="1" smtClean="0"/>
+              <a:rPr lang="en-US" dirty="0" err="1"/>
               <a:t>CodeSnippet</a:t>
             </a:r>
             <a:r>
-              <a:rPr lang="en-US" dirty="0" smtClean="0"/>
-              <a:t> that enables to log the content of the object as “name of </a:t>
-            </a:r>
-            <a:r>
-              <a:rPr lang="en-US" dirty="0" err="1" smtClean="0"/>
-              <a:t>fied</a:t>
-            </a:r>
-            <a:r>
-              <a:rPr lang="en-US" dirty="0" smtClean="0"/>
-              <a:t>: content”. For instance,</a:t>
+              <a:rPr lang="en-US" dirty="0"/>
+              <a:t> that enables to log the content of the object as “name of field: content”. For instance,</a:t>
             </a:r>
           </a:p>
           <a:p>
@@ -5651,22 +5651,18 @@
               <a:buAutoNum type="arabicPeriod"/>
             </a:pPr>
             <a:r>
-              <a:rPr lang="en-US" dirty="0" err="1" smtClean="0"/>
+              <a:rPr lang="en-US" dirty="0" err="1"/>
               <a:t>UniqueName</a:t>
             </a:r>
             <a:r>
-              <a:rPr lang="en-US" dirty="0" smtClean="0"/>
+              <a:rPr lang="en-US" dirty="0"/>
               <a:t>: </a:t>
             </a:r>
             <a:r>
               <a:rPr lang="en-US" dirty="0" err="1" smtClean="0"/>
               <a:t>edu.uci.sdcl.crowddebug.snippetfactory.createmethod</a:t>
             </a:r>
-            <a:endParaRPr lang="en-US" dirty="0" smtClean="0"/>
-          </a:p>
-          <a:p>
-            <a:pPr lvl="3"/>
-            <a:endParaRPr lang="en-US" dirty="0" smtClean="0"/>
+            <a:endParaRPr lang="en-US" dirty="0"/>
           </a:p>
         </p:txBody>
       </p:sp>
@@ -5853,9 +5849,12 @@
             </a:pPr>
             <a:r>
               <a:rPr lang="en-US" dirty="0" smtClean="0"/>
-              <a:t>Setup the path to local folder</a:t>
-            </a:r>
-            <a:endParaRPr lang="en-US" dirty="0"/>
+              <a:t>Setup </a:t>
+            </a:r>
+            <a:r>
+              <a:rPr lang="en-US" dirty="0" smtClean="0"/>
+              <a:t>debug session</a:t>
+            </a:r>
           </a:p>
           <a:p>
             <a:pPr marL="914400" lvl="1" indent="-457200">
@@ -5864,7 +5863,11 @@
             </a:pPr>
             <a:r>
               <a:rPr lang="en-US" dirty="0" smtClean="0"/>
-              <a:t>Setup debug session</a:t>
+              <a:t>Serialize the code </a:t>
+            </a:r>
+            <a:r>
+              <a:rPr lang="en-US" dirty="0" smtClean="0"/>
+              <a:t>snippets</a:t>
             </a:r>
           </a:p>
           <a:p>
@@ -5873,9 +5876,10 @@
               <a:buAutoNum type="arabicPeriod"/>
             </a:pPr>
             <a:r>
-              <a:rPr lang="en-US" dirty="0" smtClean="0"/>
-              <a:t>Serialize the code snippets</a:t>
-            </a:r>
+              <a:rPr lang="en-US" smtClean="0"/>
+              <a:t>Upload page</a:t>
+            </a:r>
+            <a:endParaRPr lang="en-US" dirty="0" smtClean="0"/>
           </a:p>
           <a:p>
             <a:pPr marL="914400" lvl="1" indent="-457200">

</xml_diff>